<commit_message>
Make the previous year pages into galleries
</commit_message>
<xml_diff>
--- a/images/customImgPPT.pptx
+++ b/images/customImgPPT.pptx
@@ -6,8 +6,9 @@
   </p:sldMasterIdLst>
   <p:sldIdLst>
     <p:sldId id="256" r:id="rId2"/>
-    <p:sldId id="257" r:id="rId3"/>
-    <p:sldId id="258" r:id="rId4"/>
+    <p:sldId id="259" r:id="rId3"/>
+    <p:sldId id="257" r:id="rId4"/>
+    <p:sldId id="258" r:id="rId5"/>
   </p:sldIdLst>
   <p:sldSz cx="12192000" cy="6858000"/>
   <p:notesSz cx="6858000" cy="9144000"/>
@@ -106,6 +107,11 @@
       </a:defRPr>
     </a:lvl9pPr>
   </p:defaultTextStyle>
+  <p:extLst>
+    <p:ext uri="{EFAFB233-063F-42B5-8137-9DF3F51BA10A}">
+      <p15:sldGuideLst xmlns:p15="http://schemas.microsoft.com/office/powerpoint/2012/main"/>
+    </p:ext>
+  </p:extLst>
 </p:presentation>
 </file>
 
@@ -3465,6 +3471,188 @@
       </p:grpSpPr>
       <p:grpSp>
         <p:nvGrpSpPr>
+          <p:cNvPr id="10" name="Group 9">
+            <a:extLst>
+              <a:ext uri="{FF2B5EF4-FFF2-40B4-BE49-F238E27FC236}">
+                <a16:creationId xmlns:a16="http://schemas.microsoft.com/office/drawing/2014/main" id="{78C3CC35-5D07-4A9A-89B9-9C7030BEDCAB}"/>
+              </a:ext>
+            </a:extLst>
+          </p:cNvPr>
+          <p:cNvGrpSpPr/>
+          <p:nvPr/>
+        </p:nvGrpSpPr>
+        <p:grpSpPr>
+          <a:xfrm>
+            <a:off x="952500" y="0"/>
+            <a:ext cx="10287000" cy="6858000"/>
+            <a:chOff x="952500" y="0"/>
+            <a:chExt cx="10287000" cy="6858000"/>
+          </a:xfrm>
+        </p:grpSpPr>
+        <p:pic>
+          <p:nvPicPr>
+            <p:cNvPr id="6" name="Picture 5" descr="A picture containing water, food, sign, beach&#10;&#10;Description automatically generated">
+              <a:extLst>
+                <a:ext uri="{FF2B5EF4-FFF2-40B4-BE49-F238E27FC236}">
+                  <a16:creationId xmlns:a16="http://schemas.microsoft.com/office/drawing/2014/main" id="{53837F78-7F4A-4EAA-85A8-860F417A3476}"/>
+                </a:ext>
+              </a:extLst>
+            </p:cNvPr>
+            <p:cNvPicPr>
+              <a:picLocks noChangeAspect="1"/>
+            </p:cNvPicPr>
+            <p:nvPr/>
+          </p:nvPicPr>
+          <p:blipFill>
+            <a:blip r:embed="rId2">
+              <a:extLst>
+                <a:ext uri="{28A0092B-C50C-407E-A947-70E740481C1C}">
+                  <a14:useLocalDpi xmlns:a14="http://schemas.microsoft.com/office/drawing/2010/main" val="0"/>
+                </a:ext>
+              </a:extLst>
+            </a:blip>
+            <a:stretch>
+              <a:fillRect/>
+            </a:stretch>
+          </p:blipFill>
+          <p:spPr>
+            <a:xfrm>
+              <a:off x="952500" y="0"/>
+              <a:ext cx="10287000" cy="6858000"/>
+            </a:xfrm>
+            <a:prstGeom prst="rect">
+              <a:avLst/>
+            </a:prstGeom>
+          </p:spPr>
+        </p:pic>
+        <p:sp>
+          <p:nvSpPr>
+            <p:cNvPr id="9" name="Rectangle 8">
+              <a:extLst>
+                <a:ext uri="{FF2B5EF4-FFF2-40B4-BE49-F238E27FC236}">
+                  <a16:creationId xmlns:a16="http://schemas.microsoft.com/office/drawing/2014/main" id="{D78DA5B6-CC37-4944-B46A-5F2BAF005AAE}"/>
+                </a:ext>
+              </a:extLst>
+            </p:cNvPr>
+            <p:cNvSpPr/>
+            <p:nvPr/>
+          </p:nvSpPr>
+          <p:spPr>
+            <a:xfrm>
+              <a:off x="3700953" y="1044102"/>
+              <a:ext cx="4431983" cy="4339650"/>
+            </a:xfrm>
+            <a:prstGeom prst="rect">
+              <a:avLst/>
+            </a:prstGeom>
+            <a:noFill/>
+          </p:spPr>
+          <p:txBody>
+            <a:bodyPr vert="horz" wrap="square" lIns="91440" tIns="45720" rIns="91440" bIns="45720" anchor="ctr">
+              <a:spAutoFit/>
+            </a:bodyPr>
+            <a:lstStyle/>
+            <a:p>
+              <a:pPr algn="ctr"/>
+              <a:r>
+                <a:rPr lang="en-US" sz="13800" b="1" cap="none" spc="0" dirty="0">
+                  <a:ln w="10160">
+                    <a:noFill/>
+                    <a:prstDash val="solid"/>
+                  </a:ln>
+                  <a:solidFill>
+                    <a:srgbClr val="6610F2"/>
+                  </a:solidFill>
+                  <a:effectLst>
+                    <a:outerShdw blurRad="38100" dist="22860" dir="5400000" algn="tl" rotWithShape="0">
+                      <a:srgbClr val="000000">
+                        <a:alpha val="30000"/>
+                      </a:srgbClr>
+                    </a:outerShdw>
+                  </a:effectLst>
+                  <a:latin typeface="Source Sans Pro" panose="020B0503030403020204" pitchFamily="34" charset="0"/>
+                  <a:ea typeface="Source Sans Pro" panose="020B0503030403020204" pitchFamily="34" charset="0"/>
+                </a:rPr>
+                <a:t>’2</a:t>
+              </a:r>
+            </a:p>
+            <a:p>
+              <a:pPr algn="ctr"/>
+              <a:r>
+                <a:rPr lang="en-US" sz="13800" b="1" cap="none" spc="0" dirty="0">
+                  <a:ln w="10160">
+                    <a:noFill/>
+                    <a:prstDash val="solid"/>
+                  </a:ln>
+                  <a:solidFill>
+                    <a:srgbClr val="6610F2"/>
+                  </a:solidFill>
+                  <a:effectLst>
+                    <a:outerShdw blurRad="38100" dist="22860" dir="5400000" algn="tl" rotWithShape="0">
+                      <a:srgbClr val="000000">
+                        <a:alpha val="30000"/>
+                      </a:srgbClr>
+                    </a:outerShdw>
+                  </a:effectLst>
+                  <a:latin typeface="Source Sans Pro" panose="020B0503030403020204" pitchFamily="34" charset="0"/>
+                  <a:ea typeface="Source Sans Pro" panose="020B0503030403020204" pitchFamily="34" charset="0"/>
+                </a:rPr>
+                <a:t> 0</a:t>
+              </a:r>
+              <a:endParaRPr lang="en-US" sz="23900" b="1" cap="none" spc="0" dirty="0">
+                <a:ln w="10160">
+                  <a:noFill/>
+                  <a:prstDash val="solid"/>
+                </a:ln>
+                <a:solidFill>
+                  <a:srgbClr val="6610F2"/>
+                </a:solidFill>
+                <a:effectLst>
+                  <a:outerShdw blurRad="38100" dist="22860" dir="5400000" algn="tl" rotWithShape="0">
+                    <a:srgbClr val="000000">
+                      <a:alpha val="30000"/>
+                    </a:srgbClr>
+                  </a:outerShdw>
+                </a:effectLst>
+                <a:latin typeface="Source Sans Pro" panose="020B0503030403020204" pitchFamily="34" charset="0"/>
+                <a:ea typeface="Source Sans Pro" panose="020B0503030403020204" pitchFamily="34" charset="0"/>
+              </a:endParaRPr>
+            </a:p>
+          </p:txBody>
+        </p:sp>
+      </p:grpSp>
+    </p:spTree>
+    <p:extLst>
+      <p:ext uri="{BB962C8B-B14F-4D97-AF65-F5344CB8AC3E}">
+        <p14:creationId xmlns:p14="http://schemas.microsoft.com/office/powerpoint/2010/main" val="2191249061"/>
+      </p:ext>
+    </p:extLst>
+  </p:cSld>
+  <p:clrMapOvr>
+    <a:masterClrMapping/>
+  </p:clrMapOvr>
+</p:sld>
+</file>
+
+<file path=ppt/slides/slide3.xml><?xml version="1.0" encoding="utf-8"?>
+<p:sld xmlns:a="http://schemas.openxmlformats.org/drawingml/2006/main" xmlns:r="http://schemas.openxmlformats.org/officeDocument/2006/relationships" xmlns:p="http://schemas.openxmlformats.org/presentationml/2006/main">
+  <p:cSld>
+    <p:spTree>
+      <p:nvGrpSpPr>
+        <p:cNvPr id="1" name=""/>
+        <p:cNvGrpSpPr/>
+        <p:nvPr/>
+      </p:nvGrpSpPr>
+      <p:grpSpPr>
+        <a:xfrm>
+          <a:off x="0" y="0"/>
+          <a:ext cx="0" cy="0"/>
+          <a:chOff x="0" y="0"/>
+          <a:chExt cx="0" cy="0"/>
+        </a:xfrm>
+      </p:grpSpPr>
+      <p:grpSp>
+        <p:nvGrpSpPr>
           <p:cNvPr id="7" name="Group 6">
             <a:extLst>
               <a:ext uri="{FF2B5EF4-FFF2-40B4-BE49-F238E27FC236}">
@@ -3586,7 +3774,7 @@
 </p:sld>
 </file>
 
-<file path=ppt/slides/slide3.xml><?xml version="1.0" encoding="utf-8"?>
+<file path=ppt/slides/slide4.xml><?xml version="1.0" encoding="utf-8"?>
 <p:sld xmlns:a="http://schemas.openxmlformats.org/drawingml/2006/main" xmlns:r="http://schemas.openxmlformats.org/officeDocument/2006/relationships" xmlns:p="http://schemas.openxmlformats.org/presentationml/2006/main">
   <p:cSld>
     <p:spTree>

</xml_diff>